<commit_message>
Agregar titulo y subtitulo
</commit_message>
<xml_diff>
--- a/sistemaaid/backend/ia/presentaciones/prueba1.pptx
+++ b/sistemaaid/backend/ia/presentaciones/prueba1.pptx
@@ -4,9 +4,6 @@
   <p:sldMasterIdLst>
     <p:sldMasterId id="2147483648" r:id="rId1"/>
   </p:sldMasterIdLst>
-  <p:sldIdLst>
-    <p:sldId id="256" r:id="rId2"/>
-  </p:sldIdLst>
   <p:sldSz cx="12192000" cy="6858000"/>
   <p:notesSz cx="6858000" cy="9144000"/>
   <p:defaultTextStyle>
@@ -146,10 +143,18 @@
           </a:xfrm>
         </p:spPr>
         <p:txBody>
-          <a:bodyPr anchor="b"/>
+          <a:bodyPr anchor="b">
+            <a:normAutofit/>
+          </a:bodyPr>
           <a:lstStyle>
             <a:lvl1pPr algn="ctr">
-              <a:defRPr sz="6000"/>
+              <a:defRPr sz="4000" b="1">
+                <a:solidFill>
+                  <a:srgbClr val="163172"/>
+                </a:solidFill>
+                <a:latin typeface="Arial" panose="020B0604020202020204" pitchFamily="34" charset="0"/>
+                <a:cs typeface="Arial" panose="020B0604020202020204" pitchFamily="34" charset="0"/>
+              </a:defRPr>
             </a:lvl1pPr>
           </a:lstStyle>
           <a:p>
@@ -178,11 +183,19 @@
           </a:xfrm>
         </p:spPr>
         <p:txBody>
-          <a:bodyPr/>
+          <a:bodyPr>
+            <a:normAutofit/>
+          </a:bodyPr>
           <a:lstStyle>
             <a:lvl1pPr marL="0" indent="0" algn="ctr">
               <a:buNone/>
-              <a:defRPr sz="2400"/>
+              <a:defRPr sz="2000">
+                <a:solidFill>
+                  <a:srgbClr val="1E56A0"/>
+                </a:solidFill>
+                <a:latin typeface="Arial" panose="020B0604020202020204" pitchFamily="34" charset="0"/>
+                <a:cs typeface="Arial" panose="020B0604020202020204" pitchFamily="34" charset="0"/>
+              </a:defRPr>
             </a:lvl1pPr>
             <a:lvl2pPr marL="457200" indent="0" algn="ctr">
               <a:buNone/>
@@ -243,7 +256,7 @@
           <a:p>
             <a:fld id="{563822C9-8B07-41D0-983B-AF6DFCFDFE79}" type="datetimeFigureOut">
               <a:rPr lang="en-US" smtClean="0"/>
-              <a:t>8/9/2022</a:t>
+              <a:t>8/10/2022</a:t>
             </a:fld>
             <a:endParaRPr lang="en-US"/>
           </a:p>
@@ -413,7 +426,7 @@
           <a:p>
             <a:fld id="{563822C9-8B07-41D0-983B-AF6DFCFDFE79}" type="datetimeFigureOut">
               <a:rPr lang="en-US" smtClean="0"/>
-              <a:t>8/9/2022</a:t>
+              <a:t>8/10/2022</a:t>
             </a:fld>
             <a:endParaRPr lang="en-US"/>
           </a:p>
@@ -593,7 +606,7 @@
           <a:p>
             <a:fld id="{563822C9-8B07-41D0-983B-AF6DFCFDFE79}" type="datetimeFigureOut">
               <a:rPr lang="en-US" smtClean="0"/>
-              <a:t>8/9/2022</a:t>
+              <a:t>8/10/2022</a:t>
             </a:fld>
             <a:endParaRPr lang="en-US"/>
           </a:p>
@@ -763,7 +776,7 @@
           <a:p>
             <a:fld id="{563822C9-8B07-41D0-983B-AF6DFCFDFE79}" type="datetimeFigureOut">
               <a:rPr lang="en-US" smtClean="0"/>
-              <a:t>8/9/2022</a:t>
+              <a:t>8/10/2022</a:t>
             </a:fld>
             <a:endParaRPr lang="en-US"/>
           </a:p>
@@ -1009,7 +1022,7 @@
           <a:p>
             <a:fld id="{563822C9-8B07-41D0-983B-AF6DFCFDFE79}" type="datetimeFigureOut">
               <a:rPr lang="en-US" smtClean="0"/>
-              <a:t>8/9/2022</a:t>
+              <a:t>8/10/2022</a:t>
             </a:fld>
             <a:endParaRPr lang="en-US"/>
           </a:p>
@@ -1241,7 +1254,7 @@
           <a:p>
             <a:fld id="{563822C9-8B07-41D0-983B-AF6DFCFDFE79}" type="datetimeFigureOut">
               <a:rPr lang="en-US" smtClean="0"/>
-              <a:t>8/9/2022</a:t>
+              <a:t>8/10/2022</a:t>
             </a:fld>
             <a:endParaRPr lang="en-US"/>
           </a:p>
@@ -1608,7 +1621,7 @@
           <a:p>
             <a:fld id="{563822C9-8B07-41D0-983B-AF6DFCFDFE79}" type="datetimeFigureOut">
               <a:rPr lang="en-US" smtClean="0"/>
-              <a:t>8/9/2022</a:t>
+              <a:t>8/10/2022</a:t>
             </a:fld>
             <a:endParaRPr lang="en-US"/>
           </a:p>
@@ -1698,14 +1711,26 @@
         </p:nvSpPr>
         <p:spPr/>
         <p:txBody>
-          <a:bodyPr/>
-          <a:lstStyle/>
-          <a:p>
-            <a:r>
-              <a:rPr lang="es-ES"/>
+          <a:bodyPr>
+            <a:noAutofit/>
+          </a:bodyPr>
+          <a:lstStyle>
+            <a:lvl1pPr algn="ctr">
+              <a:defRPr sz="2800" b="1">
+                <a:solidFill>
+                  <a:srgbClr val="163172"/>
+                </a:solidFill>
+                <a:latin typeface="Arial" panose="020B0604020202020204" pitchFamily="34" charset="0"/>
+                <a:cs typeface="Arial" panose="020B0604020202020204" pitchFamily="34" charset="0"/>
+              </a:defRPr>
+            </a:lvl1pPr>
+          </a:lstStyle>
+          <a:p>
+            <a:r>
+              <a:rPr lang="es-ES" dirty="0"/>
               <a:t>Haga clic para modificar el estilo de título del patrón</a:t>
             </a:r>
-            <a:endParaRPr lang="en-US"/>
+            <a:endParaRPr lang="en-US" dirty="0"/>
           </a:p>
         </p:txBody>
       </p:sp>
@@ -1726,7 +1751,7 @@
           <a:p>
             <a:fld id="{563822C9-8B07-41D0-983B-AF6DFCFDFE79}" type="datetimeFigureOut">
               <a:rPr lang="en-US" smtClean="0"/>
-              <a:t>8/9/2022</a:t>
+              <a:t>8/10/2022</a:t>
             </a:fld>
             <a:endParaRPr lang="en-US"/>
           </a:p>
@@ -1821,7 +1846,7 @@
           <a:p>
             <a:fld id="{563822C9-8B07-41D0-983B-AF6DFCFDFE79}" type="datetimeFigureOut">
               <a:rPr lang="en-US" smtClean="0"/>
-              <a:t>8/9/2022</a:t>
+              <a:t>8/10/2022</a:t>
             </a:fld>
             <a:endParaRPr lang="en-US"/>
           </a:p>
@@ -2098,7 +2123,7 @@
           <a:p>
             <a:fld id="{563822C9-8B07-41D0-983B-AF6DFCFDFE79}" type="datetimeFigureOut">
               <a:rPr lang="en-US" smtClean="0"/>
-              <a:t>8/9/2022</a:t>
+              <a:t>8/10/2022</a:t>
             </a:fld>
             <a:endParaRPr lang="en-US"/>
           </a:p>
@@ -2351,7 +2376,7 @@
           <a:p>
             <a:fld id="{563822C9-8B07-41D0-983B-AF6DFCFDFE79}" type="datetimeFigureOut">
               <a:rPr lang="en-US" smtClean="0"/>
-              <a:t>8/9/2022</a:t>
+              <a:t>8/10/2022</a:t>
             </a:fld>
             <a:endParaRPr lang="en-US"/>
           </a:p>
@@ -2564,7 +2589,7 @@
           <a:p>
             <a:fld id="{563822C9-8B07-41D0-983B-AF6DFCFDFE79}" type="datetimeFigureOut">
               <a:rPr lang="en-US" smtClean="0"/>
-              <a:t>8/9/2022</a:t>
+              <a:t>8/10/2022</a:t>
             </a:fld>
             <a:endParaRPr lang="en-US"/>
           </a:p>
@@ -2952,73 +2977,6 @@
 </p:sldMaster>
 </file>
 
-<file path=ppt/slides/slide1.xml><?xml version="1.0" encoding="utf-8"?>
-<p:sld xmlns:a="http://schemas.openxmlformats.org/drawingml/2006/main" xmlns:r="http://schemas.openxmlformats.org/officeDocument/2006/relationships" xmlns:p="http://schemas.openxmlformats.org/presentationml/2006/main">
-  <p:cSld>
-    <p:spTree>
-      <p:nvGrpSpPr>
-        <p:cNvPr id="1" name=""/>
-        <p:cNvGrpSpPr/>
-        <p:nvPr/>
-      </p:nvGrpSpPr>
-      <p:grpSpPr>
-        <a:xfrm>
-          <a:off x="0" y="0"/>
-          <a:ext cx="0" cy="0"/>
-          <a:chOff x="0" y="0"/>
-          <a:chExt cx="0" cy="0"/>
-        </a:xfrm>
-      </p:grpSpPr>
-      <p:sp>
-        <p:nvSpPr>
-          <p:cNvPr id="4" name="TextBox 3">
-            <a:extLst>
-              <a:ext uri="{FF2B5EF4-FFF2-40B4-BE49-F238E27FC236}">
-                <a16:creationId xmlns:a16="http://schemas.microsoft.com/office/drawing/2014/main" id="{0FD00797-641A-E939-A6BA-D37C1B559115}"/>
-              </a:ext>
-            </a:extLst>
-          </p:cNvPr>
-          <p:cNvSpPr txBox="1"/>
-          <p:nvPr/>
-        </p:nvSpPr>
-        <p:spPr>
-          <a:xfrm>
-            <a:off x="4560163" y="3075057"/>
-            <a:ext cx="3071673" cy="707886"/>
-          </a:xfrm>
-          <a:prstGeom prst="rect">
-            <a:avLst/>
-          </a:prstGeom>
-          <a:noFill/>
-        </p:spPr>
-        <p:txBody>
-          <a:bodyPr wrap="square" rtlCol="0">
-            <a:spAutoFit/>
-          </a:bodyPr>
-          <a:lstStyle/>
-          <a:p>
-            <a:pPr algn="ctr"/>
-            <a:r>
-              <a:rPr lang="en-US" sz="4000" dirty="0" err="1"/>
-              <a:t>Reporte</a:t>
-            </a:r>
-            <a:endParaRPr lang="en-US" sz="4000" dirty="0"/>
-          </a:p>
-        </p:txBody>
-      </p:sp>
-    </p:spTree>
-    <p:extLst>
-      <p:ext uri="{BB962C8B-B14F-4D97-AF65-F5344CB8AC3E}">
-        <p14:creationId xmlns:p14="http://schemas.microsoft.com/office/powerpoint/2010/main" val="2785110343"/>
-      </p:ext>
-    </p:extLst>
-  </p:cSld>
-  <p:clrMapOvr>
-    <a:masterClrMapping/>
-  </p:clrMapOvr>
-</p:sld>
-</file>
-
 <file path=ppt/theme/theme1.xml><?xml version="1.0" encoding="utf-8"?>
 <a:theme xmlns:a="http://schemas.openxmlformats.org/drawingml/2006/main" name="Tema de Office">
   <a:themeElements>

</xml_diff>